<commit_message>
entered pic to boking system ppt
</commit_message>
<xml_diff>
--- a/Presentation/DigiBP_DanishBlue_Presentation_V0.3.pptx
+++ b/Presentation/DigiBP_DanishBlue_Presentation_V0.3.pptx
@@ -718,6 +718,174 @@
       </p:grpSpPr>
       <p:sp>
         <p:nvSpPr>
+          <p:cNvPr id="2" name="Slide Image Placeholder 1"/>
+          <p:cNvSpPr>
+            <a:spLocks noGrp="1" noRot="1" noChangeAspect="1"/>
+          </p:cNvSpPr>
+          <p:nvPr>
+            <p:ph type="sldImg"/>
+          </p:nvPr>
+        </p:nvSpPr>
+        <p:spPr/>
+      </p:sp>
+      <p:sp>
+        <p:nvSpPr>
+          <p:cNvPr id="3" name="Notes Placeholder 2"/>
+          <p:cNvSpPr>
+            <a:spLocks noGrp="1"/>
+          </p:cNvSpPr>
+          <p:nvPr>
+            <p:ph type="body" idx="1"/>
+          </p:nvPr>
+        </p:nvSpPr>
+        <p:spPr/>
+        <p:txBody>
+          <a:bodyPr/>
+          <a:lstStyle/>
+          <a:p>
+            <a:endParaRPr lang="en-CH" dirty="0"/>
+          </a:p>
+        </p:txBody>
+      </p:sp>
+      <p:sp>
+        <p:nvSpPr>
+          <p:cNvPr id="4" name="Slide Number Placeholder 3"/>
+          <p:cNvSpPr>
+            <a:spLocks noGrp="1"/>
+          </p:cNvSpPr>
+          <p:nvPr>
+            <p:ph type="sldNum" sz="quarter" idx="5"/>
+          </p:nvPr>
+        </p:nvSpPr>
+        <p:spPr/>
+        <p:txBody>
+          <a:bodyPr/>
+          <a:lstStyle/>
+          <a:p>
+            <a:fld id="{6BBF85C1-6754-4204-B548-F7F3F6EBC05E}" type="slidenum">
+              <a:rPr lang="en-US" smtClean="0"/>
+              <a:t>2</a:t>
+            </a:fld>
+            <a:endParaRPr lang="en-US"/>
+          </a:p>
+        </p:txBody>
+      </p:sp>
+    </p:spTree>
+    <p:extLst>
+      <p:ext uri="{BB962C8B-B14F-4D97-AF65-F5344CB8AC3E}">
+        <p14:creationId xmlns:p14="http://schemas.microsoft.com/office/powerpoint/2010/main" val="3301092783"/>
+      </p:ext>
+    </p:extLst>
+  </p:cSld>
+  <p:clrMapOvr>
+    <a:masterClrMapping/>
+  </p:clrMapOvr>
+</p:notes>
+</file>
+
+<file path=ppt/notesSlides/notesSlide2.xml><?xml version="1.0" encoding="utf-8"?>
+<p:notes xmlns:a="http://schemas.openxmlformats.org/drawingml/2006/main" xmlns:r="http://schemas.openxmlformats.org/officeDocument/2006/relationships" xmlns:p="http://schemas.openxmlformats.org/presentationml/2006/main">
+  <p:cSld>
+    <p:spTree>
+      <p:nvGrpSpPr>
+        <p:cNvPr id="1" name=""/>
+        <p:cNvGrpSpPr/>
+        <p:nvPr/>
+      </p:nvGrpSpPr>
+      <p:grpSpPr>
+        <a:xfrm>
+          <a:off x="0" y="0"/>
+          <a:ext cx="0" cy="0"/>
+          <a:chOff x="0" y="0"/>
+          <a:chExt cx="0" cy="0"/>
+        </a:xfrm>
+      </p:grpSpPr>
+      <p:sp>
+        <p:nvSpPr>
+          <p:cNvPr id="2" name="Slide Image Placeholder 1"/>
+          <p:cNvSpPr>
+            <a:spLocks noGrp="1" noRot="1" noChangeAspect="1"/>
+          </p:cNvSpPr>
+          <p:nvPr>
+            <p:ph type="sldImg"/>
+          </p:nvPr>
+        </p:nvSpPr>
+        <p:spPr/>
+      </p:sp>
+      <p:sp>
+        <p:nvSpPr>
+          <p:cNvPr id="3" name="Notes Placeholder 2"/>
+          <p:cNvSpPr>
+            <a:spLocks noGrp="1"/>
+          </p:cNvSpPr>
+          <p:nvPr>
+            <p:ph type="body" idx="1"/>
+          </p:nvPr>
+        </p:nvSpPr>
+        <p:spPr/>
+        <p:txBody>
+          <a:bodyPr/>
+          <a:lstStyle/>
+          <a:p>
+            <a:endParaRPr lang="en-CH" dirty="0"/>
+          </a:p>
+        </p:txBody>
+      </p:sp>
+      <p:sp>
+        <p:nvSpPr>
+          <p:cNvPr id="4" name="Slide Number Placeholder 3"/>
+          <p:cNvSpPr>
+            <a:spLocks noGrp="1"/>
+          </p:cNvSpPr>
+          <p:nvPr>
+            <p:ph type="sldNum" sz="quarter" idx="5"/>
+          </p:nvPr>
+        </p:nvSpPr>
+        <p:spPr/>
+        <p:txBody>
+          <a:bodyPr/>
+          <a:lstStyle/>
+          <a:p>
+            <a:fld id="{6BBF85C1-6754-4204-B548-F7F3F6EBC05E}" type="slidenum">
+              <a:rPr lang="en-US" smtClean="0"/>
+              <a:t>6</a:t>
+            </a:fld>
+            <a:endParaRPr lang="en-US"/>
+          </a:p>
+        </p:txBody>
+      </p:sp>
+    </p:spTree>
+    <p:extLst>
+      <p:ext uri="{BB962C8B-B14F-4D97-AF65-F5344CB8AC3E}">
+        <p14:creationId xmlns:p14="http://schemas.microsoft.com/office/powerpoint/2010/main" val="3575169363"/>
+      </p:ext>
+    </p:extLst>
+  </p:cSld>
+  <p:clrMapOvr>
+    <a:masterClrMapping/>
+  </p:clrMapOvr>
+</p:notes>
+</file>
+
+<file path=ppt/notesSlides/notesSlide3.xml><?xml version="1.0" encoding="utf-8"?>
+<p:notes xmlns:a="http://schemas.openxmlformats.org/drawingml/2006/main" xmlns:r="http://schemas.openxmlformats.org/officeDocument/2006/relationships" xmlns:p="http://schemas.openxmlformats.org/presentationml/2006/main">
+  <p:cSld>
+    <p:spTree>
+      <p:nvGrpSpPr>
+        <p:cNvPr id="1" name=""/>
+        <p:cNvGrpSpPr/>
+        <p:nvPr/>
+      </p:nvGrpSpPr>
+      <p:grpSpPr>
+        <a:xfrm>
+          <a:off x="0" y="0"/>
+          <a:ext cx="0" cy="0"/>
+          <a:chOff x="0" y="0"/>
+          <a:chExt cx="0" cy="0"/>
+        </a:xfrm>
+      </p:grpSpPr>
+      <p:sp>
+        <p:nvSpPr>
           <p:cNvPr id="2" name="Folienbildplatzhalter 1"/>
           <p:cNvSpPr>
             <a:spLocks noGrp="1" noRot="1" noChangeAspect="1"/>
@@ -5312,7 +5480,7 @@
         </p:nvSpPr>
         <p:spPr>
           <a:xfrm>
-            <a:off x="2433211" y="673629"/>
+            <a:off x="3467533" y="942549"/>
             <a:ext cx="9212760" cy="360720"/>
           </a:xfrm>
           <a:prstGeom prst="rect">
@@ -5590,7 +5758,7 @@
         </p:nvSpPr>
         <p:spPr>
           <a:xfrm>
-            <a:off x="573354" y="1572189"/>
+            <a:off x="573354" y="2160079"/>
             <a:ext cx="9542772" cy="3447098"/>
           </a:xfrm>
           <a:prstGeom prst="rect">
@@ -5677,6 +5845,36 @@
           </a:p>
         </p:txBody>
       </p:sp>
+      <p:pic>
+        <p:nvPicPr>
+          <p:cNvPr id="5" name="Picture 4">
+            <a:extLst>
+              <a:ext uri="{FF2B5EF4-FFF2-40B4-BE49-F238E27FC236}">
+                <a16:creationId xmlns:a16="http://schemas.microsoft.com/office/drawing/2014/main" id="{02CB8AE5-4697-0148-86F4-8664FE36B971}"/>
+              </a:ext>
+            </a:extLst>
+          </p:cNvPr>
+          <p:cNvPicPr>
+            <a:picLocks noChangeAspect="1"/>
+          </p:cNvPicPr>
+          <p:nvPr/>
+        </p:nvPicPr>
+        <p:blipFill>
+          <a:blip r:embed="rId2"/>
+          <a:stretch>
+            <a:fillRect/>
+          </a:stretch>
+        </p:blipFill>
+        <p:spPr>
+          <a:xfrm>
+            <a:off x="8220600" y="208860"/>
+            <a:ext cx="2260600" cy="1131410"/>
+          </a:xfrm>
+          <a:prstGeom prst="rect">
+            <a:avLst/>
+          </a:prstGeom>
+        </p:spPr>
+      </p:pic>
     </p:spTree>
   </p:cSld>
   <p:clrMapOvr>
@@ -6792,7 +6990,7 @@
           <p:nvPr/>
         </p:nvPicPr>
         <p:blipFill>
-          <a:blip r:embed="rId2">
+          <a:blip r:embed="rId3">
             <a:extLst>
               <a:ext uri="{28A0092B-C50C-407E-A947-70E740481C1C}">
                 <a14:useLocalDpi xmlns:a14="http://schemas.microsoft.com/office/drawing/2010/main" val="0"/>
@@ -6839,7 +7037,7 @@
           <p:nvPr/>
         </p:nvPicPr>
         <p:blipFill>
-          <a:blip r:embed="rId3">
+          <a:blip r:embed="rId4">
             <a:extLst>
               <a:ext uri="{28A0092B-C50C-407E-A947-70E740481C1C}">
                 <a14:useLocalDpi xmlns:a14="http://schemas.microsoft.com/office/drawing/2010/main" val="0"/>
@@ -8324,7 +8522,7 @@
           <p:nvPr/>
         </p:nvPicPr>
         <p:blipFill>
-          <a:blip r:embed="rId2"/>
+          <a:blip r:embed="rId3"/>
           <a:stretch>
             <a:fillRect/>
           </a:stretch>
@@ -8354,7 +8552,7 @@
           <p:nvPr/>
         </p:nvPicPr>
         <p:blipFill>
-          <a:blip r:embed="rId3"/>
+          <a:blip r:embed="rId4"/>
           <a:stretch>
             <a:fillRect/>
           </a:stretch>

</xml_diff>